<commit_message>
added all of the mini venns
</commit_message>
<xml_diff>
--- a/capstone-presentation.pptx
+++ b/capstone-presentation.pptx
@@ -5,15 +5,17 @@
     <p:sldMasterId id="2147483648" r:id="rId1"/>
   </p:sldMasterIdLst>
   <p:notesMasterIdLst>
-    <p:notesMasterId r:id="rId8"/>
+    <p:notesMasterId r:id="rId10"/>
   </p:notesMasterIdLst>
   <p:sldIdLst>
     <p:sldId id="256" r:id="rId2"/>
     <p:sldId id="260" r:id="rId3"/>
     <p:sldId id="257" r:id="rId4"/>
     <p:sldId id="259" r:id="rId5"/>
-    <p:sldId id="258" r:id="rId6"/>
-    <p:sldId id="261" r:id="rId7"/>
+    <p:sldId id="262" r:id="rId6"/>
+    <p:sldId id="263" r:id="rId7"/>
+    <p:sldId id="258" r:id="rId8"/>
+    <p:sldId id="261" r:id="rId9"/>
   </p:sldIdLst>
   <p:sldSz cx="9144000" cy="6858000" type="screen4x3"/>
   <p:notesSz cx="6858000" cy="9144000"/>
@@ -7212,6 +7214,781 @@
       </p:grpSpPr>
       <p:grpSp>
         <p:nvGrpSpPr>
+          <p:cNvPr id="16" name="Group 15"/>
+          <p:cNvGrpSpPr/>
+          <p:nvPr/>
+        </p:nvGrpSpPr>
+        <p:grpSpPr>
+          <a:xfrm>
+            <a:off x="1269108" y="5376456"/>
+            <a:ext cx="1344602" cy="1344602"/>
+            <a:chOff x="4491567" y="3162300"/>
+            <a:chExt cx="2971800" cy="2971800"/>
+          </a:xfrm>
+        </p:grpSpPr>
+        <p:sp>
+          <p:nvSpPr>
+            <p:cNvPr id="13" name="Oval 12"/>
+            <p:cNvSpPr/>
+            <p:nvPr/>
+          </p:nvSpPr>
+          <p:spPr>
+            <a:xfrm>
+              <a:off x="4491567" y="3162300"/>
+              <a:ext cx="2971800" cy="2971800"/>
+            </a:xfrm>
+            <a:prstGeom prst="ellipse">
+              <a:avLst/>
+            </a:prstGeom>
+            <a:solidFill>
+              <a:srgbClr val="343046">
+                <a:alpha val="98000"/>
+              </a:srgbClr>
+            </a:solidFill>
+            <a:ln>
+              <a:noFill/>
+            </a:ln>
+          </p:spPr>
+          <p:style>
+            <a:lnRef idx="2">
+              <a:schemeClr val="accent1">
+                <a:shade val="50000"/>
+              </a:schemeClr>
+            </a:lnRef>
+            <a:fillRef idx="1">
+              <a:schemeClr val="accent1"/>
+            </a:fillRef>
+            <a:effectRef idx="0">
+              <a:schemeClr val="accent1"/>
+            </a:effectRef>
+            <a:fontRef idx="minor">
+              <a:schemeClr val="lt1"/>
+            </a:fontRef>
+          </p:style>
+          <p:txBody>
+            <a:bodyPr rtlCol="0" anchor="ctr"/>
+            <a:lstStyle/>
+            <a:p>
+              <a:pPr algn="ctr"/>
+              <a:endParaRPr lang="en-US"/>
+            </a:p>
+          </p:txBody>
+        </p:sp>
+        <p:sp>
+          <p:nvSpPr>
+            <p:cNvPr id="10" name="TextBox 9"/>
+            <p:cNvSpPr txBox="1"/>
+            <p:nvPr/>
+          </p:nvSpPr>
+          <p:spPr>
+            <a:xfrm>
+              <a:off x="5029200" y="4267199"/>
+              <a:ext cx="2057399" cy="1714316"/>
+            </a:xfrm>
+            <a:prstGeom prst="rect">
+              <a:avLst/>
+            </a:prstGeom>
+            <a:noFill/>
+          </p:spPr>
+          <p:txBody>
+            <a:bodyPr wrap="square" rtlCol="0">
+              <a:spAutoFit/>
+            </a:bodyPr>
+            <a:lstStyle/>
+            <a:p>
+              <a:pPr algn="ctr"/>
+              <a:r>
+                <a:rPr lang="en-US" sz="1400" dirty="0" smtClean="0">
+                  <a:effectLst>
+                    <a:glow rad="63500">
+                      <a:srgbClr val="343046"/>
+                    </a:glow>
+                    <a:reflection blurRad="6350" stA="55000" endA="300" endPos="45500" dir="5400000" sy="-100000" algn="bl" rotWithShape="0"/>
+                  </a:effectLst>
+                </a:rPr>
+                <a:t>Control</a:t>
+              </a:r>
+              <a:endParaRPr lang="en-US" sz="1400" dirty="0">
+                <a:effectLst>
+                  <a:glow rad="63500">
+                    <a:srgbClr val="343046"/>
+                  </a:glow>
+                  <a:reflection blurRad="6350" stA="55000" endA="300" endPos="45500" dir="5400000" sy="-100000" algn="bl" rotWithShape="0"/>
+                </a:effectLst>
+              </a:endParaRPr>
+            </a:p>
+          </p:txBody>
+        </p:sp>
+      </p:grpSp>
+      <p:sp>
+        <p:nvSpPr>
+          <p:cNvPr id="12" name="Oval 11"/>
+          <p:cNvSpPr/>
+          <p:nvPr/>
+        </p:nvSpPr>
+        <p:spPr>
+          <a:xfrm>
+            <a:off x="658099" y="4635201"/>
+            <a:ext cx="1344602" cy="1344602"/>
+          </a:xfrm>
+          <a:prstGeom prst="ellipse">
+            <a:avLst/>
+          </a:prstGeom>
+          <a:solidFill>
+            <a:srgbClr val="322F45">
+              <a:alpha val="98000"/>
+            </a:srgbClr>
+          </a:solidFill>
+          <a:ln>
+            <a:noFill/>
+          </a:ln>
+        </p:spPr>
+        <p:style>
+          <a:lnRef idx="2">
+            <a:schemeClr val="accent1">
+              <a:shade val="50000"/>
+            </a:schemeClr>
+          </a:lnRef>
+          <a:fillRef idx="1">
+            <a:schemeClr val="accent1"/>
+          </a:fillRef>
+          <a:effectRef idx="0">
+            <a:schemeClr val="accent1"/>
+          </a:effectRef>
+          <a:fontRef idx="minor">
+            <a:schemeClr val="lt1"/>
+          </a:fontRef>
+        </p:style>
+        <p:txBody>
+          <a:bodyPr rtlCol="0" anchor="ctr"/>
+          <a:lstStyle/>
+          <a:p>
+            <a:pPr algn="ctr"/>
+            <a:endParaRPr lang="en-US"/>
+          </a:p>
+        </p:txBody>
+      </p:sp>
+      <p:sp>
+        <p:nvSpPr>
+          <p:cNvPr id="7" name="TextBox 6"/>
+          <p:cNvSpPr txBox="1"/>
+          <p:nvPr/>
+        </p:nvSpPr>
+        <p:spPr>
+          <a:xfrm>
+            <a:off x="821865" y="5104054"/>
+            <a:ext cx="1040056" cy="338554"/>
+          </a:xfrm>
+          <a:prstGeom prst="rect">
+            <a:avLst/>
+          </a:prstGeom>
+          <a:noFill/>
+        </p:spPr>
+        <p:txBody>
+          <a:bodyPr wrap="square" rtlCol="0">
+            <a:spAutoFit/>
+          </a:bodyPr>
+          <a:lstStyle/>
+          <a:p>
+            <a:pPr algn="ctr"/>
+            <a:r>
+              <a:rPr lang="en-US" sz="1600" dirty="0" smtClean="0">
+                <a:effectLst>
+                  <a:glow rad="25400">
+                    <a:srgbClr val="505178"/>
+                  </a:glow>
+                  <a:reflection blurRad="6350" stA="55000" endA="300" endPos="45500" dir="5400000" sy="-100000" algn="bl" rotWithShape="0"/>
+                </a:effectLst>
+              </a:rPr>
+              <a:t>Education</a:t>
+            </a:r>
+            <a:endParaRPr lang="en-US" sz="1600" dirty="0">
+              <a:effectLst>
+                <a:glow rad="25400">
+                  <a:srgbClr val="505178"/>
+                </a:glow>
+                <a:reflection blurRad="6350" stA="55000" endA="300" endPos="45500" dir="5400000" sy="-100000" algn="bl" rotWithShape="0"/>
+              </a:effectLst>
+            </a:endParaRPr>
+          </a:p>
+        </p:txBody>
+      </p:sp>
+      <p:grpSp>
+        <p:nvGrpSpPr>
+          <p:cNvPr id="3" name="Group 2"/>
+          <p:cNvGrpSpPr/>
+          <p:nvPr/>
+        </p:nvGrpSpPr>
+        <p:grpSpPr>
+          <a:xfrm>
+            <a:off x="116044" y="5424341"/>
+            <a:ext cx="1344602" cy="1344602"/>
+            <a:chOff x="116044" y="5424341"/>
+            <a:chExt cx="1344602" cy="1344602"/>
+          </a:xfrm>
+        </p:grpSpPr>
+        <p:sp>
+          <p:nvSpPr>
+            <p:cNvPr id="5" name="Oval 4"/>
+            <p:cNvSpPr/>
+            <p:nvPr/>
+          </p:nvSpPr>
+          <p:spPr>
+            <a:xfrm>
+              <a:off x="116044" y="5424341"/>
+              <a:ext cx="1344602" cy="1344602"/>
+            </a:xfrm>
+            <a:prstGeom prst="ellipse">
+              <a:avLst/>
+            </a:prstGeom>
+            <a:solidFill>
+              <a:srgbClr val="111119">
+                <a:alpha val="98000"/>
+              </a:srgbClr>
+            </a:solidFill>
+            <a:ln>
+              <a:noFill/>
+            </a:ln>
+          </p:spPr>
+          <p:style>
+            <a:lnRef idx="2">
+              <a:schemeClr val="accent1">
+                <a:shade val="50000"/>
+              </a:schemeClr>
+            </a:lnRef>
+            <a:fillRef idx="1">
+              <a:schemeClr val="accent1"/>
+            </a:fillRef>
+            <a:effectRef idx="0">
+              <a:schemeClr val="accent1"/>
+            </a:effectRef>
+            <a:fontRef idx="minor">
+              <a:schemeClr val="lt1"/>
+            </a:fontRef>
+          </p:style>
+          <p:txBody>
+            <a:bodyPr rtlCol="0" anchor="ctr"/>
+            <a:lstStyle/>
+            <a:p>
+              <a:pPr algn="ctr"/>
+              <a:endParaRPr lang="en-US"/>
+            </a:p>
+          </p:txBody>
+        </p:sp>
+        <p:sp>
+          <p:nvSpPr>
+            <p:cNvPr id="9" name="TextBox 8"/>
+            <p:cNvSpPr txBox="1"/>
+            <p:nvPr/>
+          </p:nvSpPr>
+          <p:spPr>
+            <a:xfrm>
+              <a:off x="340145" y="5900856"/>
+              <a:ext cx="930878" cy="307777"/>
+            </a:xfrm>
+            <a:prstGeom prst="rect">
+              <a:avLst/>
+            </a:prstGeom>
+            <a:noFill/>
+            <a:effectLst>
+              <a:glow rad="63500">
+                <a:srgbClr val="505178">
+                  <a:alpha val="5000"/>
+                </a:srgbClr>
+              </a:glow>
+            </a:effectLst>
+          </p:spPr>
+          <p:txBody>
+            <a:bodyPr wrap="square" rtlCol="0">
+              <a:spAutoFit/>
+            </a:bodyPr>
+            <a:lstStyle/>
+            <a:p>
+              <a:pPr algn="ctr"/>
+              <a:r>
+                <a:rPr lang="en-US" sz="1400" dirty="0" smtClean="0">
+                  <a:effectLst>
+                    <a:glow rad="63500">
+                      <a:srgbClr val="322F45">
+                        <a:alpha val="81000"/>
+                      </a:srgbClr>
+                    </a:glow>
+                    <a:reflection blurRad="6350" stA="55000" endA="300" endPos="45500" dir="5400000" sy="-100000" algn="bl" rotWithShape="0"/>
+                  </a:effectLst>
+                </a:rPr>
+                <a:t>Design</a:t>
+              </a:r>
+              <a:endParaRPr lang="en-US" sz="1400" dirty="0">
+                <a:effectLst>
+                  <a:glow rad="63500">
+                    <a:srgbClr val="322F45">
+                      <a:alpha val="81000"/>
+                    </a:srgbClr>
+                  </a:glow>
+                  <a:reflection blurRad="6350" stA="55000" endA="300" endPos="45500" dir="5400000" sy="-100000" algn="bl" rotWithShape="0"/>
+                </a:effectLst>
+              </a:endParaRPr>
+            </a:p>
+          </p:txBody>
+        </p:sp>
+      </p:grpSp>
+      <p:sp>
+        <p:nvSpPr>
+          <p:cNvPr id="2" name="Title 1"/>
+          <p:cNvSpPr>
+            <a:spLocks noGrp="1"/>
+          </p:cNvSpPr>
+          <p:nvPr>
+            <p:ph type="title"/>
+          </p:nvPr>
+        </p:nvSpPr>
+        <p:spPr>
+          <a:xfrm>
+            <a:off x="255836" y="5330907"/>
+            <a:ext cx="2188842" cy="717850"/>
+          </a:xfrm>
+        </p:spPr>
+        <p:txBody>
+          <a:bodyPr>
+            <a:normAutofit fontScale="90000"/>
+          </a:bodyPr>
+          <a:lstStyle/>
+          <a:p>
+            <a:r>
+              <a:rPr lang="en-US" sz="3200" dirty="0" smtClean="0">
+                <a:solidFill>
+                  <a:schemeClr val="bg1"/>
+                </a:solidFill>
+              </a:rPr>
+              <a:t>Applications</a:t>
+            </a:r>
+            <a:endParaRPr lang="en-US" sz="3200" dirty="0">
+              <a:solidFill>
+                <a:schemeClr val="bg1"/>
+              </a:solidFill>
+            </a:endParaRPr>
+          </a:p>
+        </p:txBody>
+      </p:sp>
+    </p:spTree>
+    <p:extLst>
+      <p:ext uri="{BB962C8B-B14F-4D97-AF65-F5344CB8AC3E}">
+        <p14:creationId xmlns:p14="http://schemas.microsoft.com/office/powerpoint/2010/main" val="2672324722"/>
+      </p:ext>
+    </p:extLst>
+  </p:cSld>
+  <p:clrMapOvr>
+    <a:masterClrMapping/>
+  </p:clrMapOvr>
+  <p:timing>
+    <p:tnLst>
+      <p:par>
+        <p:cTn id="1" dur="indefinite" restart="never" nodeType="tmRoot"/>
+      </p:par>
+    </p:tnLst>
+  </p:timing>
+</p:sld>
+</file>
+
+<file path=ppt/slides/slide6.xml><?xml version="1.0" encoding="utf-8"?>
+<p:sld xmlns:a="http://schemas.openxmlformats.org/drawingml/2006/main" xmlns:r="http://schemas.openxmlformats.org/officeDocument/2006/relationships" xmlns:p="http://schemas.openxmlformats.org/presentationml/2006/main">
+  <p:cSld>
+    <p:spTree>
+      <p:nvGrpSpPr>
+        <p:cNvPr id="1" name=""/>
+        <p:cNvGrpSpPr/>
+        <p:nvPr/>
+      </p:nvGrpSpPr>
+      <p:grpSpPr>
+        <a:xfrm>
+          <a:off x="0" y="0"/>
+          <a:ext cx="0" cy="0"/>
+          <a:chOff x="0" y="0"/>
+          <a:chExt cx="0" cy="0"/>
+        </a:xfrm>
+      </p:grpSpPr>
+      <p:sp>
+        <p:nvSpPr>
+          <p:cNvPr id="12" name="Oval 11"/>
+          <p:cNvSpPr/>
+          <p:nvPr/>
+        </p:nvSpPr>
+        <p:spPr>
+          <a:xfrm>
+            <a:off x="658099" y="4635201"/>
+            <a:ext cx="1344602" cy="1344602"/>
+          </a:xfrm>
+          <a:prstGeom prst="ellipse">
+            <a:avLst/>
+          </a:prstGeom>
+          <a:solidFill>
+            <a:srgbClr val="322F45">
+              <a:alpha val="98000"/>
+            </a:srgbClr>
+          </a:solidFill>
+          <a:ln>
+            <a:noFill/>
+          </a:ln>
+        </p:spPr>
+        <p:style>
+          <a:lnRef idx="2">
+            <a:schemeClr val="accent1">
+              <a:shade val="50000"/>
+            </a:schemeClr>
+          </a:lnRef>
+          <a:fillRef idx="1">
+            <a:schemeClr val="accent1"/>
+          </a:fillRef>
+          <a:effectRef idx="0">
+            <a:schemeClr val="accent1"/>
+          </a:effectRef>
+          <a:fontRef idx="minor">
+            <a:schemeClr val="lt1"/>
+          </a:fontRef>
+        </p:style>
+        <p:txBody>
+          <a:bodyPr rtlCol="0" anchor="ctr"/>
+          <a:lstStyle/>
+          <a:p>
+            <a:pPr algn="ctr"/>
+            <a:endParaRPr lang="en-US"/>
+          </a:p>
+        </p:txBody>
+      </p:sp>
+      <p:sp>
+        <p:nvSpPr>
+          <p:cNvPr id="7" name="TextBox 6"/>
+          <p:cNvSpPr txBox="1"/>
+          <p:nvPr/>
+        </p:nvSpPr>
+        <p:spPr>
+          <a:xfrm>
+            <a:off x="821865" y="5104054"/>
+            <a:ext cx="1040056" cy="338554"/>
+          </a:xfrm>
+          <a:prstGeom prst="rect">
+            <a:avLst/>
+          </a:prstGeom>
+          <a:noFill/>
+        </p:spPr>
+        <p:txBody>
+          <a:bodyPr wrap="square" rtlCol="0">
+            <a:spAutoFit/>
+          </a:bodyPr>
+          <a:lstStyle/>
+          <a:p>
+            <a:pPr algn="ctr"/>
+            <a:r>
+              <a:rPr lang="en-US" sz="1600" dirty="0" smtClean="0">
+                <a:effectLst>
+                  <a:glow rad="25400">
+                    <a:srgbClr val="505178"/>
+                  </a:glow>
+                  <a:reflection blurRad="6350" stA="55000" endA="300" endPos="45500" dir="5400000" sy="-100000" algn="bl" rotWithShape="0"/>
+                </a:effectLst>
+              </a:rPr>
+              <a:t>Education</a:t>
+            </a:r>
+            <a:endParaRPr lang="en-US" sz="1600" dirty="0">
+              <a:effectLst>
+                <a:glow rad="25400">
+                  <a:srgbClr val="505178"/>
+                </a:glow>
+                <a:reflection blurRad="6350" stA="55000" endA="300" endPos="45500" dir="5400000" sy="-100000" algn="bl" rotWithShape="0"/>
+              </a:effectLst>
+            </a:endParaRPr>
+          </a:p>
+        </p:txBody>
+      </p:sp>
+      <p:sp>
+        <p:nvSpPr>
+          <p:cNvPr id="5" name="Oval 4"/>
+          <p:cNvSpPr/>
+          <p:nvPr/>
+        </p:nvSpPr>
+        <p:spPr>
+          <a:xfrm>
+            <a:off x="116044" y="5424341"/>
+            <a:ext cx="1344602" cy="1344602"/>
+          </a:xfrm>
+          <a:prstGeom prst="ellipse">
+            <a:avLst/>
+          </a:prstGeom>
+          <a:solidFill>
+            <a:srgbClr val="343046">
+              <a:alpha val="98000"/>
+            </a:srgbClr>
+          </a:solidFill>
+          <a:ln>
+            <a:noFill/>
+          </a:ln>
+        </p:spPr>
+        <p:style>
+          <a:lnRef idx="2">
+            <a:schemeClr val="accent1">
+              <a:shade val="50000"/>
+            </a:schemeClr>
+          </a:lnRef>
+          <a:fillRef idx="1">
+            <a:schemeClr val="accent1"/>
+          </a:fillRef>
+          <a:effectRef idx="0">
+            <a:schemeClr val="accent1"/>
+          </a:effectRef>
+          <a:fontRef idx="minor">
+            <a:schemeClr val="lt1"/>
+          </a:fontRef>
+        </p:style>
+        <p:txBody>
+          <a:bodyPr rtlCol="0" anchor="ctr"/>
+          <a:lstStyle/>
+          <a:p>
+            <a:pPr algn="ctr"/>
+            <a:endParaRPr lang="en-US"/>
+          </a:p>
+        </p:txBody>
+      </p:sp>
+      <p:sp>
+        <p:nvSpPr>
+          <p:cNvPr id="9" name="TextBox 8"/>
+          <p:cNvSpPr txBox="1"/>
+          <p:nvPr/>
+        </p:nvSpPr>
+        <p:spPr>
+          <a:xfrm>
+            <a:off x="340145" y="5900856"/>
+            <a:ext cx="930878" cy="307777"/>
+          </a:xfrm>
+          <a:prstGeom prst="rect">
+            <a:avLst/>
+          </a:prstGeom>
+          <a:noFill/>
+          <a:effectLst>
+            <a:glow rad="63500">
+              <a:srgbClr val="505178">
+                <a:alpha val="5000"/>
+              </a:srgbClr>
+            </a:glow>
+          </a:effectLst>
+        </p:spPr>
+        <p:txBody>
+          <a:bodyPr wrap="square" rtlCol="0">
+            <a:spAutoFit/>
+          </a:bodyPr>
+          <a:lstStyle/>
+          <a:p>
+            <a:pPr algn="ctr"/>
+            <a:r>
+              <a:rPr lang="en-US" sz="1400" dirty="0" smtClean="0">
+                <a:effectLst>
+                  <a:glow rad="63500">
+                    <a:srgbClr val="322F45">
+                      <a:alpha val="81000"/>
+                    </a:srgbClr>
+                  </a:glow>
+                  <a:reflection blurRad="6350" stA="55000" endA="300" endPos="45500" dir="5400000" sy="-100000" algn="bl" rotWithShape="0"/>
+                </a:effectLst>
+              </a:rPr>
+              <a:t>Design</a:t>
+            </a:r>
+            <a:endParaRPr lang="en-US" sz="1400" dirty="0">
+              <a:effectLst>
+                <a:glow rad="63500">
+                  <a:srgbClr val="322F45">
+                    <a:alpha val="81000"/>
+                  </a:srgbClr>
+                </a:glow>
+                <a:reflection blurRad="6350" stA="55000" endA="300" endPos="45500" dir="5400000" sy="-100000" algn="bl" rotWithShape="0"/>
+              </a:effectLst>
+            </a:endParaRPr>
+          </a:p>
+        </p:txBody>
+      </p:sp>
+      <p:grpSp>
+        <p:nvGrpSpPr>
+          <p:cNvPr id="4" name="Group 3"/>
+          <p:cNvGrpSpPr/>
+          <p:nvPr/>
+        </p:nvGrpSpPr>
+        <p:grpSpPr>
+          <a:xfrm>
+            <a:off x="1269108" y="5376456"/>
+            <a:ext cx="1344602" cy="1344602"/>
+            <a:chOff x="1269108" y="5376456"/>
+            <a:chExt cx="1344602" cy="1344602"/>
+          </a:xfrm>
+        </p:grpSpPr>
+        <p:sp>
+          <p:nvSpPr>
+            <p:cNvPr id="13" name="Oval 12"/>
+            <p:cNvSpPr/>
+            <p:nvPr/>
+          </p:nvSpPr>
+          <p:spPr>
+            <a:xfrm>
+              <a:off x="1269108" y="5376456"/>
+              <a:ext cx="1344602" cy="1344602"/>
+            </a:xfrm>
+            <a:prstGeom prst="ellipse">
+              <a:avLst/>
+            </a:prstGeom>
+            <a:solidFill>
+              <a:srgbClr val="111119">
+                <a:alpha val="98000"/>
+              </a:srgbClr>
+            </a:solidFill>
+            <a:ln>
+              <a:noFill/>
+            </a:ln>
+          </p:spPr>
+          <p:style>
+            <a:lnRef idx="2">
+              <a:schemeClr val="accent1">
+                <a:shade val="50000"/>
+              </a:schemeClr>
+            </a:lnRef>
+            <a:fillRef idx="1">
+              <a:schemeClr val="accent1"/>
+            </a:fillRef>
+            <a:effectRef idx="0">
+              <a:schemeClr val="accent1"/>
+            </a:effectRef>
+            <a:fontRef idx="minor">
+              <a:schemeClr val="lt1"/>
+            </a:fontRef>
+          </p:style>
+          <p:txBody>
+            <a:bodyPr rtlCol="0" anchor="ctr"/>
+            <a:lstStyle/>
+            <a:p>
+              <a:pPr algn="ctr"/>
+              <a:endParaRPr lang="en-US"/>
+            </a:p>
+          </p:txBody>
+        </p:sp>
+        <p:sp>
+          <p:nvSpPr>
+            <p:cNvPr id="10" name="TextBox 9"/>
+            <p:cNvSpPr txBox="1"/>
+            <p:nvPr/>
+          </p:nvSpPr>
+          <p:spPr>
+            <a:xfrm>
+              <a:off x="1512362" y="5876372"/>
+              <a:ext cx="930878" cy="775649"/>
+            </a:xfrm>
+            <a:prstGeom prst="rect">
+              <a:avLst/>
+            </a:prstGeom>
+            <a:noFill/>
+          </p:spPr>
+          <p:txBody>
+            <a:bodyPr wrap="square" rtlCol="0">
+              <a:spAutoFit/>
+            </a:bodyPr>
+            <a:lstStyle/>
+            <a:p>
+              <a:pPr algn="ctr"/>
+              <a:r>
+                <a:rPr lang="en-US" sz="1400" dirty="0" smtClean="0">
+                  <a:effectLst>
+                    <a:glow rad="63500">
+                      <a:srgbClr val="343046"/>
+                    </a:glow>
+                    <a:reflection blurRad="6350" stA="55000" endA="300" endPos="45500" dir="5400000" sy="-100000" algn="bl" rotWithShape="0"/>
+                  </a:effectLst>
+                </a:rPr>
+                <a:t>Control</a:t>
+              </a:r>
+              <a:endParaRPr lang="en-US" sz="1400" dirty="0">
+                <a:effectLst>
+                  <a:glow rad="63500">
+                    <a:srgbClr val="343046"/>
+                  </a:glow>
+                  <a:reflection blurRad="6350" stA="55000" endA="300" endPos="45500" dir="5400000" sy="-100000" algn="bl" rotWithShape="0"/>
+                </a:effectLst>
+              </a:endParaRPr>
+            </a:p>
+          </p:txBody>
+        </p:sp>
+      </p:grpSp>
+      <p:sp>
+        <p:nvSpPr>
+          <p:cNvPr id="2" name="Title 1"/>
+          <p:cNvSpPr>
+            <a:spLocks noGrp="1"/>
+          </p:cNvSpPr>
+          <p:nvPr>
+            <p:ph type="title"/>
+          </p:nvPr>
+        </p:nvSpPr>
+        <p:spPr>
+          <a:xfrm>
+            <a:off x="255836" y="5330907"/>
+            <a:ext cx="2188842" cy="717850"/>
+          </a:xfrm>
+        </p:spPr>
+        <p:txBody>
+          <a:bodyPr>
+            <a:normAutofit fontScale="90000"/>
+          </a:bodyPr>
+          <a:lstStyle/>
+          <a:p>
+            <a:r>
+              <a:rPr lang="en-US" sz="3200" dirty="0" smtClean="0">
+                <a:solidFill>
+                  <a:schemeClr val="bg1"/>
+                </a:solidFill>
+              </a:rPr>
+              <a:t>Applications</a:t>
+            </a:r>
+            <a:endParaRPr lang="en-US" sz="3200" dirty="0">
+              <a:solidFill>
+                <a:schemeClr val="bg1"/>
+              </a:solidFill>
+            </a:endParaRPr>
+          </a:p>
+        </p:txBody>
+      </p:sp>
+    </p:spTree>
+    <p:extLst>
+      <p:ext uri="{BB962C8B-B14F-4D97-AF65-F5344CB8AC3E}">
+        <p14:creationId xmlns:p14="http://schemas.microsoft.com/office/powerpoint/2010/main" val="2730604455"/>
+      </p:ext>
+    </p:extLst>
+  </p:cSld>
+  <p:clrMapOvr>
+    <a:masterClrMapping/>
+  </p:clrMapOvr>
+  <p:timing>
+    <p:tnLst>
+      <p:par>
+        <p:cTn id="1" dur="indefinite" restart="never" nodeType="tmRoot"/>
+      </p:par>
+    </p:tnLst>
+  </p:timing>
+</p:sld>
+</file>
+
+<file path=ppt/slides/slide7.xml><?xml version="1.0" encoding="utf-8"?>
+<p:sld xmlns:a="http://schemas.openxmlformats.org/drawingml/2006/main" xmlns:r="http://schemas.openxmlformats.org/officeDocument/2006/relationships" xmlns:p="http://schemas.openxmlformats.org/presentationml/2006/main">
+  <p:cSld>
+    <p:spTree>
+      <p:nvGrpSpPr>
+        <p:cNvPr id="1" name=""/>
+        <p:cNvGrpSpPr/>
+        <p:nvPr/>
+      </p:nvGrpSpPr>
+      <p:grpSpPr>
+        <a:xfrm>
+          <a:off x="0" y="0"/>
+          <a:ext cx="0" cy="0"/>
+          <a:chOff x="0" y="0"/>
+          <a:chExt cx="0" cy="0"/>
+        </a:xfrm>
+      </p:grpSpPr>
+      <p:grpSp>
+        <p:nvGrpSpPr>
           <p:cNvPr id="3" name="Group 2"/>
           <p:cNvGrpSpPr/>
           <p:nvPr/>
@@ -7749,7 +8526,7 @@
 </p:sld>
 </file>
 
-<file path=ppt/slides/slide6.xml><?xml version="1.0" encoding="utf-8"?>
+<file path=ppt/slides/slide8.xml><?xml version="1.0" encoding="utf-8"?>
 <p:sld xmlns:a="http://schemas.openxmlformats.org/drawingml/2006/main" xmlns:r="http://schemas.openxmlformats.org/officeDocument/2006/relationships" xmlns:p="http://schemas.openxmlformats.org/presentationml/2006/main">
   <p:cSld>
     <p:spTree>

</xml_diff>

<commit_message>
added kdree and presentation changes
</commit_message>
<xml_diff>
--- a/capstone-presentation.pptx
+++ b/capstone-presentation.pptx
@@ -5316,16 +5316,16 @@
       </p:sp>
       <p:grpSp>
         <p:nvGrpSpPr>
-          <p:cNvPr id="24" name="Group 23"/>
+          <p:cNvPr id="29" name="Group 28"/>
           <p:cNvGrpSpPr/>
           <p:nvPr/>
         </p:nvGrpSpPr>
         <p:grpSpPr>
           <a:xfrm>
-            <a:off x="1981200" y="2438400"/>
-            <a:ext cx="5181600" cy="2895600"/>
-            <a:chOff x="2158788" y="2743200"/>
-            <a:chExt cx="5181600" cy="2895600"/>
+            <a:off x="2015067" y="2438400"/>
+            <a:ext cx="3315969" cy="2895600"/>
+            <a:chOff x="2015067" y="2438400"/>
+            <a:chExt cx="3315969" cy="2895600"/>
           </a:xfrm>
         </p:grpSpPr>
         <p:cxnSp>
@@ -5336,7 +5336,7 @@
           </p:nvCxnSpPr>
           <p:spPr>
             <a:xfrm flipH="1">
-              <a:off x="2717801" y="2743200"/>
+              <a:off x="2540213" y="2438400"/>
               <a:ext cx="2093381" cy="1820333"/>
             </a:xfrm>
             <a:prstGeom prst="straightConnector1">
@@ -5371,7 +5371,7 @@
           </p:nvCxnSpPr>
           <p:spPr>
             <a:xfrm flipH="1">
-              <a:off x="2192655" y="3886200"/>
+              <a:off x="2015067" y="3581400"/>
               <a:ext cx="2015490" cy="1752600"/>
             </a:xfrm>
             <a:prstGeom prst="straightConnector1">
@@ -5406,7 +5406,7 @@
           </p:nvCxnSpPr>
           <p:spPr>
             <a:xfrm flipH="1">
-              <a:off x="3756024" y="3352800"/>
+              <a:off x="3578436" y="3048000"/>
               <a:ext cx="1752600" cy="1524000"/>
             </a:xfrm>
             <a:prstGeom prst="straightConnector1">
@@ -5433,136 +5433,136 @@
             </a:fontRef>
           </p:style>
         </p:cxnSp>
-        <p:grpSp>
-          <p:nvGrpSpPr>
-            <p:cNvPr id="23" name="Group 22"/>
-            <p:cNvGrpSpPr/>
+      </p:grpSp>
+      <p:grpSp>
+        <p:nvGrpSpPr>
+          <p:cNvPr id="23" name="Group 22"/>
+          <p:cNvGrpSpPr/>
+          <p:nvPr/>
+        </p:nvGrpSpPr>
+        <p:grpSpPr>
+          <a:xfrm>
+            <a:off x="1981200" y="3246647"/>
+            <a:ext cx="5181600" cy="1779990"/>
+            <a:chOff x="2819400" y="3472921"/>
+            <a:chExt cx="3276600" cy="1125582"/>
+          </a:xfrm>
+        </p:grpSpPr>
+        <p:cxnSp>
+          <p:nvCxnSpPr>
+            <p:cNvPr id="17" name="Straight Arrow Connector 16"/>
+            <p:cNvCxnSpPr/>
             <p:nvPr/>
-          </p:nvGrpSpPr>
-          <p:grpSpPr>
+          </p:nvCxnSpPr>
+          <p:spPr>
             <a:xfrm>
-              <a:off x="2158788" y="3551447"/>
-              <a:ext cx="5181600" cy="1779990"/>
-              <a:chOff x="2819400" y="3472921"/>
-              <a:chExt cx="3276600" cy="1125582"/>
+              <a:off x="2819400" y="3505200"/>
+              <a:ext cx="3276600" cy="0"/>
             </a:xfrm>
-          </p:grpSpPr>
-          <p:cxnSp>
-            <p:nvCxnSpPr>
-              <p:cNvPr id="17" name="Straight Arrow Connector 16"/>
-              <p:cNvCxnSpPr/>
-              <p:nvPr/>
-            </p:nvCxnSpPr>
-            <p:spPr>
-              <a:xfrm>
-                <a:off x="2819400" y="3505200"/>
-                <a:ext cx="3276600" cy="0"/>
-              </a:xfrm>
-              <a:prstGeom prst="straightConnector1">
-                <a:avLst/>
-              </a:prstGeom>
-              <a:ln>
-                <a:headEnd type="triangle"/>
-                <a:tailEnd type="triangle"/>
-              </a:ln>
-            </p:spPr>
-            <p:style>
-              <a:lnRef idx="1">
-                <a:schemeClr val="accent1"/>
-              </a:lnRef>
-              <a:fillRef idx="0">
-                <a:schemeClr val="accent1"/>
-              </a:fillRef>
-              <a:effectRef idx="0">
-                <a:schemeClr val="accent1"/>
-              </a:effectRef>
-              <a:fontRef idx="minor">
-                <a:schemeClr val="tx1"/>
-              </a:fontRef>
-            </p:style>
-          </p:cxnSp>
-          <p:sp>
-            <p:nvSpPr>
-              <p:cNvPr id="18" name="Oval 17"/>
-              <p:cNvSpPr/>
-              <p:nvPr/>
-            </p:nvSpPr>
-            <p:spPr>
-              <a:xfrm flipV="1">
-                <a:off x="4425421" y="3472921"/>
-                <a:ext cx="64558" cy="64558"/>
-              </a:xfrm>
-              <a:prstGeom prst="ellipse">
-                <a:avLst/>
-              </a:prstGeom>
-              <a:solidFill>
-                <a:schemeClr val="accent1"/>
-              </a:solidFill>
-              <a:ln>
-                <a:noFill/>
-              </a:ln>
-            </p:spPr>
-            <p:style>
-              <a:lnRef idx="2">
-                <a:schemeClr val="accent1">
-                  <a:shade val="50000"/>
-                </a:schemeClr>
-              </a:lnRef>
-              <a:fillRef idx="1">
-                <a:schemeClr val="accent1"/>
-              </a:fillRef>
-              <a:effectRef idx="0">
-                <a:schemeClr val="accent1"/>
-              </a:effectRef>
-              <a:fontRef idx="minor">
-                <a:schemeClr val="lt1"/>
-              </a:fontRef>
-            </p:style>
-            <p:txBody>
-              <a:bodyPr rtlCol="0" anchor="ctr"/>
-              <a:lstStyle/>
-              <a:p>
-                <a:pPr algn="ctr"/>
-                <a:endParaRPr lang="en-US"/>
-              </a:p>
-            </p:txBody>
-          </p:sp>
-          <p:cxnSp>
-            <p:nvCxnSpPr>
-              <p:cNvPr id="21" name="Straight Arrow Connector 20"/>
-              <p:cNvCxnSpPr/>
-              <p:nvPr/>
-            </p:nvCxnSpPr>
-            <p:spPr>
-              <a:xfrm flipH="1">
-                <a:off x="3200400" y="3505199"/>
-                <a:ext cx="1257300" cy="1093304"/>
-              </a:xfrm>
-              <a:prstGeom prst="straightConnector1">
-                <a:avLst/>
-              </a:prstGeom>
-              <a:ln w="19050" cmpd="sng">
-                <a:prstDash val="solid"/>
-                <a:headEnd type="none"/>
-                <a:tailEnd type="triangle" w="med" len="med"/>
-              </a:ln>
-            </p:spPr>
-            <p:style>
-              <a:lnRef idx="1">
-                <a:schemeClr val="accent1"/>
-              </a:lnRef>
-              <a:fillRef idx="0">
-                <a:schemeClr val="accent1"/>
-              </a:fillRef>
-              <a:effectRef idx="0">
-                <a:schemeClr val="accent1"/>
-              </a:effectRef>
-              <a:fontRef idx="minor">
-                <a:schemeClr val="tx1"/>
-              </a:fontRef>
-            </p:style>
-          </p:cxnSp>
-        </p:grpSp>
+            <a:prstGeom prst="straightConnector1">
+              <a:avLst/>
+            </a:prstGeom>
+            <a:ln>
+              <a:headEnd type="triangle"/>
+              <a:tailEnd type="triangle"/>
+            </a:ln>
+          </p:spPr>
+          <p:style>
+            <a:lnRef idx="1">
+              <a:schemeClr val="accent1"/>
+            </a:lnRef>
+            <a:fillRef idx="0">
+              <a:schemeClr val="accent1"/>
+            </a:fillRef>
+            <a:effectRef idx="0">
+              <a:schemeClr val="accent1"/>
+            </a:effectRef>
+            <a:fontRef idx="minor">
+              <a:schemeClr val="tx1"/>
+            </a:fontRef>
+          </p:style>
+        </p:cxnSp>
+        <p:sp>
+          <p:nvSpPr>
+            <p:cNvPr id="18" name="Oval 17"/>
+            <p:cNvSpPr/>
+            <p:nvPr/>
+          </p:nvSpPr>
+          <p:spPr>
+            <a:xfrm flipV="1">
+              <a:off x="4425421" y="3472921"/>
+              <a:ext cx="64558" cy="64558"/>
+            </a:xfrm>
+            <a:prstGeom prst="ellipse">
+              <a:avLst/>
+            </a:prstGeom>
+            <a:solidFill>
+              <a:schemeClr val="accent1"/>
+            </a:solidFill>
+            <a:ln>
+              <a:noFill/>
+            </a:ln>
+          </p:spPr>
+          <p:style>
+            <a:lnRef idx="2">
+              <a:schemeClr val="accent1">
+                <a:shade val="50000"/>
+              </a:schemeClr>
+            </a:lnRef>
+            <a:fillRef idx="1">
+              <a:schemeClr val="accent1"/>
+            </a:fillRef>
+            <a:effectRef idx="0">
+              <a:schemeClr val="accent1"/>
+            </a:effectRef>
+            <a:fontRef idx="minor">
+              <a:schemeClr val="lt1"/>
+            </a:fontRef>
+          </p:style>
+          <p:txBody>
+            <a:bodyPr rtlCol="0" anchor="ctr"/>
+            <a:lstStyle/>
+            <a:p>
+              <a:pPr algn="ctr"/>
+              <a:endParaRPr lang="en-US"/>
+            </a:p>
+          </p:txBody>
+        </p:sp>
+        <p:cxnSp>
+          <p:nvCxnSpPr>
+            <p:cNvPr id="21" name="Straight Arrow Connector 20"/>
+            <p:cNvCxnSpPr/>
+            <p:nvPr/>
+          </p:nvCxnSpPr>
+          <p:spPr>
+            <a:xfrm flipH="1">
+              <a:off x="3200400" y="3505199"/>
+              <a:ext cx="1257300" cy="1093304"/>
+            </a:xfrm>
+            <a:prstGeom prst="straightConnector1">
+              <a:avLst/>
+            </a:prstGeom>
+            <a:ln w="19050" cmpd="sng">
+              <a:prstDash val="solid"/>
+              <a:headEnd type="none"/>
+              <a:tailEnd type="triangle" w="med" len="med"/>
+            </a:ln>
+          </p:spPr>
+          <p:style>
+            <a:lnRef idx="1">
+              <a:schemeClr val="accent1"/>
+            </a:lnRef>
+            <a:fillRef idx="0">
+              <a:schemeClr val="accent1"/>
+            </a:fillRef>
+            <a:effectRef idx="0">
+              <a:schemeClr val="accent1"/>
+            </a:effectRef>
+            <a:fontRef idx="minor">
+              <a:schemeClr val="tx1"/>
+            </a:fontRef>
+          </p:style>
+        </p:cxnSp>
       </p:grpSp>
       <p:sp>
         <p:nvSpPr>
@@ -5872,9 +5872,292 @@
   <p:timing>
     <p:tnLst>
       <p:par>
-        <p:cTn id="1" dur="indefinite" restart="never" nodeType="tmRoot"/>
+        <p:cTn id="1" dur="indefinite" restart="never" nodeType="tmRoot">
+          <p:childTnLst>
+            <p:seq concurrent="1" nextAc="seek">
+              <p:cTn id="2" dur="indefinite" nodeType="mainSeq">
+                <p:childTnLst>
+                  <p:par>
+                    <p:cTn id="3" fill="hold">
+                      <p:stCondLst>
+                        <p:cond delay="indefinite"/>
+                      </p:stCondLst>
+                      <p:childTnLst>
+                        <p:par>
+                          <p:cTn id="4" fill="hold">
+                            <p:stCondLst>
+                              <p:cond delay="0"/>
+                            </p:stCondLst>
+                            <p:childTnLst>
+                              <p:par>
+                                <p:cTn id="5" presetID="42" presetClass="path" presetSubtype="0" accel="50000" decel="50000" fill="hold" nodeType="clickEffect">
+                                  <p:stCondLst>
+                                    <p:cond delay="0"/>
+                                  </p:stCondLst>
+                                  <p:childTnLst>
+                                    <p:animMotion origin="layout" path="M 0.39167 -0.41111 L 5.55112E-17 1.11111E-6 " pathEditMode="relative" rAng="0" ptsTypes="AA">
+                                      <p:cBhvr>
+                                        <p:cTn id="6" dur="2000" fill="hold"/>
+                                        <p:tgtEl>
+                                          <p:spTgt spid="29"/>
+                                        </p:tgtEl>
+                                        <p:attrNameLst>
+                                          <p:attrName>ppt_x</p:attrName>
+                                          <p:attrName>ppt_y</p:attrName>
+                                        </p:attrNameLst>
+                                      </p:cBhvr>
+                                      <p:rCtr x="-19583" y="20556"/>
+                                    </p:animMotion>
+                                  </p:childTnLst>
+                                </p:cTn>
+                              </p:par>
+                              <p:par>
+                                <p:cTn id="7" presetID="10" presetClass="entr" presetSubtype="0" fill="hold" nodeType="withEffect">
+                                  <p:stCondLst>
+                                    <p:cond delay="0"/>
+                                  </p:stCondLst>
+                                  <p:childTnLst>
+                                    <p:set>
+                                      <p:cBhvr>
+                                        <p:cTn id="8" dur="1" fill="hold">
+                                          <p:stCondLst>
+                                            <p:cond delay="0"/>
+                                          </p:stCondLst>
+                                        </p:cTn>
+                                        <p:tgtEl>
+                                          <p:spTgt spid="29"/>
+                                        </p:tgtEl>
+                                        <p:attrNameLst>
+                                          <p:attrName>style.visibility</p:attrName>
+                                        </p:attrNameLst>
+                                      </p:cBhvr>
+                                      <p:to>
+                                        <p:strVal val="visible"/>
+                                      </p:to>
+                                    </p:set>
+                                    <p:animEffect transition="in" filter="fade">
+                                      <p:cBhvr>
+                                        <p:cTn id="9" dur="500"/>
+                                        <p:tgtEl>
+                                          <p:spTgt spid="29"/>
+                                        </p:tgtEl>
+                                      </p:cBhvr>
+                                    </p:animEffect>
+                                  </p:childTnLst>
+                                </p:cTn>
+                              </p:par>
+                            </p:childTnLst>
+                          </p:cTn>
+                        </p:par>
+                        <p:par>
+                          <p:cTn id="10" fill="hold">
+                            <p:stCondLst>
+                              <p:cond delay="2000"/>
+                            </p:stCondLst>
+                            <p:childTnLst>
+                              <p:par>
+                                <p:cTn id="11" presetID="10" presetClass="entr" presetSubtype="0" fill="hold" nodeType="afterEffect">
+                                  <p:stCondLst>
+                                    <p:cond delay="0"/>
+                                  </p:stCondLst>
+                                  <p:childTnLst>
+                                    <p:set>
+                                      <p:cBhvr>
+                                        <p:cTn id="12" dur="1" fill="hold">
+                                          <p:stCondLst>
+                                            <p:cond delay="0"/>
+                                          </p:stCondLst>
+                                        </p:cTn>
+                                        <p:tgtEl>
+                                          <p:spTgt spid="23"/>
+                                        </p:tgtEl>
+                                        <p:attrNameLst>
+                                          <p:attrName>style.visibility</p:attrName>
+                                        </p:attrNameLst>
+                                      </p:cBhvr>
+                                      <p:to>
+                                        <p:strVal val="visible"/>
+                                      </p:to>
+                                    </p:set>
+                                    <p:animEffect transition="in" filter="fade">
+                                      <p:cBhvr>
+                                        <p:cTn id="13" dur="500"/>
+                                        <p:tgtEl>
+                                          <p:spTgt spid="23"/>
+                                        </p:tgtEl>
+                                      </p:cBhvr>
+                                    </p:animEffect>
+                                  </p:childTnLst>
+                                </p:cTn>
+                              </p:par>
+                              <p:par>
+                                <p:cTn id="14" presetID="42" presetClass="path" presetSubtype="0" accel="50000" decel="50000" fill="hold" nodeType="withEffect">
+                                  <p:stCondLst>
+                                    <p:cond delay="0"/>
+                                  </p:stCondLst>
+                                  <p:childTnLst>
+                                    <p:animMotion origin="layout" path="M 0.35833 -0.42523 L -0.03333 -0.00301 " pathEditMode="relative" rAng="0" ptsTypes="AA">
+                                      <p:cBhvr>
+                                        <p:cTn id="15" dur="2000" fill="hold"/>
+                                        <p:tgtEl>
+                                          <p:spTgt spid="23"/>
+                                        </p:tgtEl>
+                                        <p:attrNameLst>
+                                          <p:attrName>ppt_x</p:attrName>
+                                          <p:attrName>ppt_y</p:attrName>
+                                        </p:attrNameLst>
+                                      </p:cBhvr>
+                                      <p:rCtr x="-19583" y="21111"/>
+                                    </p:animMotion>
+                                  </p:childTnLst>
+                                </p:cTn>
+                              </p:par>
+                            </p:childTnLst>
+                          </p:cTn>
+                        </p:par>
+                        <p:par>
+                          <p:cTn id="16" fill="hold">
+                            <p:stCondLst>
+                              <p:cond delay="4000"/>
+                            </p:stCondLst>
+                            <p:childTnLst>
+                              <p:par>
+                                <p:cTn id="17" presetID="10" presetClass="entr" presetSubtype="0" fill="hold" grpId="0" nodeType="afterEffect">
+                                  <p:stCondLst>
+                                    <p:cond delay="0"/>
+                                  </p:stCondLst>
+                                  <p:childTnLst>
+                                    <p:set>
+                                      <p:cBhvr>
+                                        <p:cTn id="18" dur="1" fill="hold">
+                                          <p:stCondLst>
+                                            <p:cond delay="0"/>
+                                          </p:stCondLst>
+                                        </p:cTn>
+                                        <p:tgtEl>
+                                          <p:spTgt spid="27"/>
+                                        </p:tgtEl>
+                                        <p:attrNameLst>
+                                          <p:attrName>style.visibility</p:attrName>
+                                        </p:attrNameLst>
+                                      </p:cBhvr>
+                                      <p:to>
+                                        <p:strVal val="visible"/>
+                                      </p:to>
+                                    </p:set>
+                                    <p:animEffect transition="in" filter="fade">
+                                      <p:cBhvr>
+                                        <p:cTn id="19" dur="500"/>
+                                        <p:tgtEl>
+                                          <p:spTgt spid="27"/>
+                                        </p:tgtEl>
+                                      </p:cBhvr>
+                                    </p:animEffect>
+                                  </p:childTnLst>
+                                </p:cTn>
+                              </p:par>
+                              <p:par>
+                                <p:cTn id="20" presetID="10" presetClass="entr" presetSubtype="0" fill="hold" grpId="0" nodeType="withEffect">
+                                  <p:stCondLst>
+                                    <p:cond delay="0"/>
+                                  </p:stCondLst>
+                                  <p:childTnLst>
+                                    <p:set>
+                                      <p:cBhvr>
+                                        <p:cTn id="21" dur="1" fill="hold">
+                                          <p:stCondLst>
+                                            <p:cond delay="0"/>
+                                          </p:stCondLst>
+                                        </p:cTn>
+                                        <p:tgtEl>
+                                          <p:spTgt spid="26"/>
+                                        </p:tgtEl>
+                                        <p:attrNameLst>
+                                          <p:attrName>style.visibility</p:attrName>
+                                        </p:attrNameLst>
+                                      </p:cBhvr>
+                                      <p:to>
+                                        <p:strVal val="visible"/>
+                                      </p:to>
+                                    </p:set>
+                                    <p:animEffect transition="in" filter="fade">
+                                      <p:cBhvr>
+                                        <p:cTn id="22" dur="500"/>
+                                        <p:tgtEl>
+                                          <p:spTgt spid="26"/>
+                                        </p:tgtEl>
+                                      </p:cBhvr>
+                                    </p:animEffect>
+                                  </p:childTnLst>
+                                </p:cTn>
+                              </p:par>
+                              <p:par>
+                                <p:cTn id="23" presetID="10" presetClass="entr" presetSubtype="0" fill="hold" grpId="0" nodeType="withEffect">
+                                  <p:stCondLst>
+                                    <p:cond delay="0"/>
+                                  </p:stCondLst>
+                                  <p:childTnLst>
+                                    <p:set>
+                                      <p:cBhvr>
+                                        <p:cTn id="24" dur="1" fill="hold">
+                                          <p:stCondLst>
+                                            <p:cond delay="0"/>
+                                          </p:stCondLst>
+                                        </p:cTn>
+                                        <p:tgtEl>
+                                          <p:spTgt spid="28"/>
+                                        </p:tgtEl>
+                                        <p:attrNameLst>
+                                          <p:attrName>style.visibility</p:attrName>
+                                        </p:attrNameLst>
+                                      </p:cBhvr>
+                                      <p:to>
+                                        <p:strVal val="visible"/>
+                                      </p:to>
+                                    </p:set>
+                                    <p:animEffect transition="in" filter="fade">
+                                      <p:cBhvr>
+                                        <p:cTn id="25" dur="500"/>
+                                        <p:tgtEl>
+                                          <p:spTgt spid="28"/>
+                                        </p:tgtEl>
+                                      </p:cBhvr>
+                                    </p:animEffect>
+                                  </p:childTnLst>
+                                </p:cTn>
+                              </p:par>
+                            </p:childTnLst>
+                          </p:cTn>
+                        </p:par>
+                      </p:childTnLst>
+                    </p:cTn>
+                  </p:par>
+                </p:childTnLst>
+              </p:cTn>
+              <p:prevCondLst>
+                <p:cond evt="onPrev" delay="0">
+                  <p:tgtEl>
+                    <p:sldTgt/>
+                  </p:tgtEl>
+                </p:cond>
+              </p:prevCondLst>
+              <p:nextCondLst>
+                <p:cond evt="onNext" delay="0">
+                  <p:tgtEl>
+                    <p:sldTgt/>
+                  </p:tgtEl>
+                </p:cond>
+              </p:nextCondLst>
+            </p:seq>
+          </p:childTnLst>
+        </p:cTn>
       </p:par>
     </p:tnLst>
+    <p:bldLst>
+      <p:bldP spid="26" grpId="0"/>
+      <p:bldP spid="27" grpId="0"/>
+      <p:bldP spid="28" grpId="0"/>
+    </p:bldLst>
   </p:timing>
 </p:sld>
 </file>

</xml_diff>